<commit_message>
Update Bloc1 Equa Diff
</commit_message>
<xml_diff>
--- a/ONIP/onip_b1_methodes_numeriques/seance2_equation_diff/B1_s2_0_CircuitRC.pptx
+++ b/ONIP/onip_b1_methodes_numeriques/seance2_equation_diff/B1_s2_0_CircuitRC.pptx
@@ -205,7 +205,7 @@
           <a:p>
             <a:fld id="{95F60532-AC81-4152-B45E-E054A978F780}" type="datetimeFigureOut">
               <a:rPr lang="fr-FR" smtClean="0"/>
-              <a:t>05/05/2023</a:t>
+              <a:t>26/09/2023</a:t>
             </a:fld>
             <a:endParaRPr lang="fr-FR"/>
           </a:p>
@@ -712,7 +712,7 @@
           <a:p>
             <a:fld id="{785B9D93-2D6F-4658-911E-89FF557AACEE}" type="datetime1">
               <a:rPr lang="en-US" smtClean="0"/>
-              <a:t>5/5/2023</a:t>
+              <a:t>9/26/2023</a:t>
             </a:fld>
             <a:endParaRPr lang="en-US" dirty="0"/>
           </a:p>
@@ -1082,7 +1082,7 @@
           <a:p>
             <a:fld id="{4709A133-4251-46D0-8E1C-3DC2CCEEC594}" type="datetime1">
               <a:rPr lang="en-US" smtClean="0"/>
-              <a:t>5/5/2023</a:t>
+              <a:t>9/26/2023</a:t>
             </a:fld>
             <a:endParaRPr lang="en-US"/>
           </a:p>
@@ -1291,7 +1291,7 @@
           <a:p>
             <a:fld id="{757C9D7A-C246-41BC-AB36-CBBE03C4FC3D}" type="datetime1">
               <a:rPr lang="en-US" smtClean="0"/>
-              <a:t>5/5/2023</a:t>
+              <a:t>9/26/2023</a:t>
             </a:fld>
             <a:endParaRPr lang="en-US"/>
           </a:p>
@@ -1761,7 +1761,7 @@
           <a:p>
             <a:fld id="{DD23859D-5799-4C59-B29C-0D397C1B3B07}" type="datetime1">
               <a:rPr lang="en-US" smtClean="0"/>
-              <a:t>5/5/2023</a:t>
+              <a:t>9/26/2023</a:t>
             </a:fld>
             <a:endParaRPr lang="en-US"/>
           </a:p>
@@ -2215,7 +2215,7 @@
           <a:p>
             <a:fld id="{B36A9650-6794-4EE4-9500-0C43A7CB6B4A}" type="datetime1">
               <a:rPr lang="en-US" smtClean="0"/>
-              <a:t>5/5/2023</a:t>
+              <a:t>9/26/2023</a:t>
             </a:fld>
             <a:endParaRPr lang="en-US"/>
           </a:p>
@@ -2747,7 +2747,7 @@
           <a:p>
             <a:fld id="{1792256C-3121-4D72-8DFF-855B713C834E}" type="datetime1">
               <a:rPr lang="en-US" smtClean="0"/>
-              <a:t>5/5/2023</a:t>
+              <a:t>9/26/2023</a:t>
             </a:fld>
             <a:endParaRPr lang="en-US"/>
           </a:p>
@@ -3446,7 +3446,7 @@
           <a:p>
             <a:fld id="{580DF3A2-C727-46A5-9AC9-16B2E63C7D3A}" type="datetime1">
               <a:rPr lang="en-US" smtClean="0"/>
-              <a:t>5/5/2023</a:t>
+              <a:t>9/26/2023</a:t>
             </a:fld>
             <a:endParaRPr lang="en-US"/>
           </a:p>
@@ -3775,7 +3775,7 @@
           <a:p>
             <a:fld id="{9D23748C-796D-4F23-89AF-A2738DF446EE}" type="datetime1">
               <a:rPr lang="en-US" smtClean="0"/>
-              <a:t>5/5/2023</a:t>
+              <a:t>9/26/2023</a:t>
             </a:fld>
             <a:endParaRPr lang="en-US"/>
           </a:p>
@@ -3888,7 +3888,7 @@
           <a:p>
             <a:fld id="{B3AFB1A7-BA76-4344-B812-B8E53F62AA62}" type="datetime1">
               <a:rPr lang="en-US" smtClean="0"/>
-              <a:t>5/5/2023</a:t>
+              <a:t>9/26/2023</a:t>
             </a:fld>
             <a:endParaRPr lang="en-US"/>
           </a:p>
@@ -4383,7 +4383,7 @@
           <a:p>
             <a:fld id="{D2DB139E-AA5F-415E-A7EE-D6EE1B304D34}" type="datetime1">
               <a:rPr lang="en-US" smtClean="0"/>
-              <a:t>5/5/2023</a:t>
+              <a:t>9/26/2023</a:t>
             </a:fld>
             <a:endParaRPr lang="en-US" dirty="0"/>
           </a:p>
@@ -4860,7 +4860,7 @@
           <a:p>
             <a:fld id="{B0611B75-8EAE-4E82-AD4E-BC980BBD0DF6}" type="datetime1">
               <a:rPr lang="en-US" smtClean="0"/>
-              <a:t>5/5/2023</a:t>
+              <a:t>9/26/2023</a:t>
             </a:fld>
             <a:endParaRPr lang="en-US"/>
           </a:p>
@@ -5103,7 +5103,7 @@
           <a:p>
             <a:fld id="{5A39691B-EC2E-4EEE-9557-97A59C128178}" type="datetime1">
               <a:rPr lang="en-US" smtClean="0"/>
-              <a:t>5/5/2023</a:t>
+              <a:t>9/26/2023</a:t>
             </a:fld>
             <a:endParaRPr lang="en-US"/>
           </a:p>
@@ -12391,12 +12391,19 @@
               <a:rPr lang="fr-FR" sz="2000" dirty="0">
                 <a:hlinkClick r:id="rId2"/>
               </a:rPr>
-              <a:t>https://lense.institutoptique.fr/qucs</a:t>
-            </a:r>
-            <a:r>
-              <a:rPr lang="fr-FR" sz="2000" dirty="0"/>
+              <a:t>http://lense.institutoptique.fr</a:t>
+            </a:r>
+            <a:r>
+              <a:rPr lang="fr-FR" sz="2000">
+                <a:hlinkClick r:id="rId2"/>
+              </a:rPr>
+              <a:t>/qucs/</a:t>
+            </a:r>
+            <a:r>
+              <a:rPr lang="fr-FR" sz="2000"/>
               <a:t> </a:t>
             </a:r>
+            <a:endParaRPr lang="fr-FR" sz="2000" dirty="0"/>
           </a:p>
           <a:p>
             <a:endParaRPr lang="fr-FR" sz="2000" dirty="0"/>

</xml_diff>